<commit_message>
Editados mockups y presentación
</commit_message>
<xml_diff>
--- a/Presentaciones/Presentación 3.pptx
+++ b/Presentaciones/Presentación 3.pptx
@@ -12295,8 +12295,8 @@
         </p:blipFill>
         <p:spPr>
           <a:xfrm>
-            <a:off x="2672510" y="373227"/>
-            <a:ext cx="7099615" cy="6130227"/>
+            <a:off x="2680001" y="373227"/>
+            <a:ext cx="7084633" cy="6130227"/>
           </a:xfrm>
           <a:prstGeom prst="rect">
             <a:avLst/>
@@ -12618,8 +12618,8 @@
         </p:blipFill>
         <p:spPr>
           <a:xfrm>
-            <a:off x="2797648" y="422773"/>
-            <a:ext cx="6973625" cy="6012451"/>
+            <a:off x="2808723" y="422773"/>
+            <a:ext cx="6951474" cy="6012451"/>
           </a:xfrm>
           <a:prstGeom prst="rect">
             <a:avLst/>
@@ -14813,21 +14813,21 @@
 </file>
 
 <file path=customXml/item1.xml><?xml version="1.0" encoding="utf-8"?>
+<p:properties xmlns:p="http://schemas.microsoft.com/office/2006/metadata/properties" xmlns:xsi="http://www.w3.org/2001/XMLSchema-instance" xmlns:pc="http://schemas.microsoft.com/office/infopath/2007/PartnerControls">
+  <documentManagement>
+    <Status xmlns="71af3243-3dd4-4a8d-8c0d-dd76da1f02a5">Not started</Status>
+    <MediaServiceKeyPoints xmlns="71af3243-3dd4-4a8d-8c0d-dd76da1f02a5" xsi:nil="true"/>
+  </documentManagement>
+</p:properties>
+</file>
+
+<file path=customXml/item2.xml><?xml version="1.0" encoding="utf-8"?>
 <?mso-contentType ?>
 <FormTemplates xmlns="http://schemas.microsoft.com/sharepoint/v3/contenttype/forms">
   <Display>DocumentLibraryForm</Display>
   <Edit>DocumentLibraryForm</Edit>
   <New>DocumentLibraryForm</New>
 </FormTemplates>
-</file>
-
-<file path=customXml/item2.xml><?xml version="1.0" encoding="utf-8"?>
-<p:properties xmlns:p="http://schemas.microsoft.com/office/2006/metadata/properties" xmlns:xsi="http://www.w3.org/2001/XMLSchema-instance" xmlns:pc="http://schemas.microsoft.com/office/infopath/2007/PartnerControls">
-  <documentManagement>
-    <Status xmlns="71af3243-3dd4-4a8d-8c0d-dd76da1f02a5">Not started</Status>
-    <MediaServiceKeyPoints xmlns="71af3243-3dd4-4a8d-8c0d-dd76da1f02a5" xsi:nil="true"/>
-  </documentManagement>
-</p:properties>
 </file>
 
 <file path=customXml/item3.xml><?xml version="1.0" encoding="utf-8"?>
@@ -15052,19 +15052,19 @@
 </file>
 
 <file path=customXml/itemProps1.xml><?xml version="1.0" encoding="utf-8"?>
-<ds:datastoreItem xmlns:ds="http://schemas.openxmlformats.org/officeDocument/2006/customXml" ds:itemID="{6A7FA506-1E93-4CA4-B270-1F08FD18C366}">
+<ds:datastoreItem xmlns:ds="http://schemas.openxmlformats.org/officeDocument/2006/customXml" ds:itemID="{38F4328E-77DF-41E8-952F-124AE19F1F7C}">
   <ds:schemaRefs>
-    <ds:schemaRef ds:uri="http://schemas.microsoft.com/sharepoint/v3/contenttype/forms"/>
+    <ds:schemaRef ds:uri="http://schemas.microsoft.com/office/2006/metadata/properties"/>
+    <ds:schemaRef ds:uri="http://schemas.microsoft.com/office/infopath/2007/PartnerControls"/>
+    <ds:schemaRef ds:uri="71af3243-3dd4-4a8d-8c0d-dd76da1f02a5"/>
   </ds:schemaRefs>
 </ds:datastoreItem>
 </file>
 
 <file path=customXml/itemProps2.xml><?xml version="1.0" encoding="utf-8"?>
-<ds:datastoreItem xmlns:ds="http://schemas.openxmlformats.org/officeDocument/2006/customXml" ds:itemID="{38F4328E-77DF-41E8-952F-124AE19F1F7C}">
+<ds:datastoreItem xmlns:ds="http://schemas.openxmlformats.org/officeDocument/2006/customXml" ds:itemID="{6A7FA506-1E93-4CA4-B270-1F08FD18C366}">
   <ds:schemaRefs>
-    <ds:schemaRef ds:uri="http://schemas.microsoft.com/office/2006/metadata/properties"/>
-    <ds:schemaRef ds:uri="http://schemas.microsoft.com/office/infopath/2007/PartnerControls"/>
-    <ds:schemaRef ds:uri="71af3243-3dd4-4a8d-8c0d-dd76da1f02a5"/>
+    <ds:schemaRef ds:uri="http://schemas.microsoft.com/sharepoint/v3/contenttype/forms"/>
   </ds:schemaRefs>
 </ds:datastoreItem>
 </file>

</xml_diff>

<commit_message>
Actualizada presentación de IU (Administrador de ventas)
</commit_message>
<xml_diff>
--- a/Presentaciones/Presentación 3.pptx
+++ b/Presentaciones/Presentación 3.pptx
@@ -245,7 +245,7 @@
             <a:pPr rtl="0"/>
             <a:fld id="{18320378-2036-4F3C-AC92-3EE66094F5A2}" type="datetime1">
               <a:rPr lang="es-ES" smtClean="0"/>
-              <a:t>04/01/2021</a:t>
+              <a:t>06/01/2021</a:t>
             </a:fld>
             <a:endParaRPr lang="es-ES" dirty="0"/>
           </a:p>
@@ -414,7 +414,7 @@
             <a:fld id="{C5C5202C-ECE4-47F7-9482-65B6053B1E5A}" type="datetime1">
               <a:rPr lang="es-ES" smtClean="0"/>
               <a:pPr/>
-              <a:t>04/01/2021</a:t>
+              <a:t>06/01/2021</a:t>
             </a:fld>
             <a:endParaRPr lang="es-ES" dirty="0"/>
           </a:p>
@@ -4547,7 +4547,7 @@
             <a:pPr rtl="0"/>
             <a:fld id="{6BABA8D0-EC96-4EBC-96A7-EC11A42ABD7C}" type="datetime1">
               <a:rPr lang="es-ES" noProof="0" smtClean="0"/>
-              <a:t>04/01/2021</a:t>
+              <a:t>06/01/2021</a:t>
             </a:fld>
             <a:endParaRPr lang="es-ES" noProof="0" dirty="0"/>
           </a:p>
@@ -4982,7 +4982,7 @@
             <a:pPr rtl="0"/>
             <a:fld id="{3BF86B48-0B76-40D2-83DE-7D8A970A6B47}" type="datetime1">
               <a:rPr lang="es-ES" noProof="0" smtClean="0"/>
-              <a:t>04/01/2021</a:t>
+              <a:t>06/01/2021</a:t>
             </a:fld>
             <a:endParaRPr lang="es-ES" noProof="0" dirty="0"/>
           </a:p>
@@ -5166,7 +5166,7 @@
             <a:pPr rtl="0"/>
             <a:fld id="{3BF86B48-0B76-40D2-83DE-7D8A970A6B47}" type="datetime1">
               <a:rPr lang="es-ES" noProof="0" smtClean="0"/>
-              <a:t>04/01/2021</a:t>
+              <a:t>06/01/2021</a:t>
             </a:fld>
             <a:endParaRPr lang="es-ES" noProof="0" dirty="0"/>
           </a:p>
@@ -5485,7 +5485,7 @@
             <a:pPr rtl="0"/>
             <a:fld id="{36F72F0D-0414-4CCE-BB17-4504F0E5B4B5}" type="datetime1">
               <a:rPr lang="es-ES" noProof="0" smtClean="0"/>
-              <a:t>04/01/2021</a:t>
+              <a:t>06/01/2021</a:t>
             </a:fld>
             <a:endParaRPr lang="es-ES" noProof="0" dirty="0"/>
           </a:p>
@@ -6366,7 +6366,7 @@
             <a:pPr rtl="0"/>
             <a:fld id="{0964B9D3-5A98-43E0-8A29-74C42142F240}" type="datetime1">
               <a:rPr lang="es-ES" noProof="0" smtClean="0"/>
-              <a:t>04/01/2021</a:t>
+              <a:t>06/01/2021</a:t>
             </a:fld>
             <a:endParaRPr lang="es-ES" noProof="0" dirty="0"/>
           </a:p>
@@ -7340,7 +7340,7 @@
             <a:pPr rtl="0"/>
             <a:fld id="{6B561AEE-6482-4DD7-9372-EE0BE46CAC4F}" type="datetime1">
               <a:rPr lang="es-ES" noProof="0" smtClean="0"/>
-              <a:t>04/01/2021</a:t>
+              <a:t>06/01/2021</a:t>
             </a:fld>
             <a:endParaRPr lang="es-ES" noProof="0" dirty="0"/>
           </a:p>
@@ -8041,7 +8041,7 @@
             <a:pPr rtl="0"/>
             <a:fld id="{C2754ABA-49C2-4DF9-8118-88A4955B550B}" type="datetime1">
               <a:rPr lang="es-ES" noProof="0" smtClean="0"/>
-              <a:t>04/01/2021</a:t>
+              <a:t>06/01/2021</a:t>
             </a:fld>
             <a:endParaRPr lang="es-ES" noProof="0" dirty="0"/>
           </a:p>
@@ -8811,7 +8811,7 @@
             <a:pPr rtl="0"/>
             <a:fld id="{3BF86B48-0B76-40D2-83DE-7D8A970A6B47}" type="datetime1">
               <a:rPr lang="es-ES" noProof="0" smtClean="0"/>
-              <a:t>04/01/2021</a:t>
+              <a:t>06/01/2021</a:t>
             </a:fld>
             <a:endParaRPr lang="es-ES" noProof="0" dirty="0"/>
           </a:p>
@@ -9061,7 +9061,7 @@
             <a:pPr rtl="0"/>
             <a:fld id="{3BF86B48-0B76-40D2-83DE-7D8A970A6B47}" type="datetime1">
               <a:rPr lang="es-ES" noProof="0" smtClean="0"/>
-              <a:t>04/01/2021</a:t>
+              <a:t>06/01/2021</a:t>
             </a:fld>
             <a:endParaRPr lang="es-ES" noProof="0" dirty="0"/>
           </a:p>
@@ -9297,7 +9297,7 @@
             <a:pPr rtl="0"/>
             <a:fld id="{3BF86B48-0B76-40D2-83DE-7D8A970A6B47}" type="datetime1">
               <a:rPr lang="es-ES" noProof="0" smtClean="0"/>
-              <a:t>04/01/2021</a:t>
+              <a:t>06/01/2021</a:t>
             </a:fld>
             <a:endParaRPr lang="es-ES" noProof="0" dirty="0"/>
           </a:p>
@@ -9668,7 +9668,7 @@
             <a:pPr rtl="0"/>
             <a:fld id="{6B561AEE-6482-4DD7-9372-EE0BE46CAC4F}" type="datetime1">
               <a:rPr lang="es-ES" noProof="0" smtClean="0"/>
-              <a:t>04/01/2021</a:t>
+              <a:t>06/01/2021</a:t>
             </a:fld>
             <a:endParaRPr lang="es-ES" noProof="0" dirty="0"/>
           </a:p>
@@ -10331,7 +10331,7 @@
             <a:pPr rtl="0"/>
             <a:fld id="{C2754ABA-49C2-4DF9-8118-88A4955B550B}" type="datetime1">
               <a:rPr lang="es-ES" noProof="0" smtClean="0"/>
-              <a:t>04/01/2021</a:t>
+              <a:t>06/01/2021</a:t>
             </a:fld>
             <a:endParaRPr lang="es-ES" noProof="0" dirty="0"/>
           </a:p>
@@ -10971,7 +10971,7 @@
             <a:pPr rtl="0"/>
             <a:fld id="{2EC06B31-DAB9-4974-B8AF-6F1E9BD45DCF}" type="datetime1">
               <a:rPr lang="es-ES" noProof="0" smtClean="0"/>
-              <a:t>04/01/2021</a:t>
+              <a:t>06/01/2021</a:t>
             </a:fld>
             <a:endParaRPr lang="es-ES" noProof="0" dirty="0"/>
           </a:p>
@@ -11251,7 +11251,7 @@
             <a:pPr rtl="0"/>
             <a:fld id="{3BF86B48-0B76-40D2-83DE-7D8A970A6B47}" type="datetime1">
               <a:rPr lang="es-ES" noProof="0" smtClean="0"/>
-              <a:t>04/01/2021</a:t>
+              <a:t>06/01/2021</a:t>
             </a:fld>
             <a:endParaRPr lang="es-ES" noProof="0" dirty="0"/>
           </a:p>
@@ -11512,7 +11512,7 @@
             <a:pPr rtl="0"/>
             <a:fld id="{3BF86B48-0B76-40D2-83DE-7D8A970A6B47}" type="datetime1">
               <a:rPr lang="es-ES" noProof="0" smtClean="0"/>
-              <a:t>04/01/2021</a:t>
+              <a:t>06/01/2021</a:t>
             </a:fld>
             <a:endParaRPr lang="es-ES" noProof="0" dirty="0"/>
           </a:p>
@@ -11729,7 +11729,7 @@
             <a:pPr rtl="0"/>
             <a:fld id="{3BF86B48-0B76-40D2-83DE-7D8A970A6B47}" type="datetime1">
               <a:rPr lang="es-ES" noProof="0" smtClean="0"/>
-              <a:t>04/01/2021</a:t>
+              <a:t>06/01/2021</a:t>
             </a:fld>
             <a:endParaRPr lang="es-ES" noProof="0" dirty="0"/>
           </a:p>
@@ -13045,8 +13045,8 @@
         </p:blipFill>
         <p:spPr>
           <a:xfrm>
-            <a:off x="2753119" y="363886"/>
-            <a:ext cx="7062685" cy="6130227"/>
+            <a:off x="2753827" y="363886"/>
+            <a:ext cx="7061268" cy="6130227"/>
           </a:xfrm>
           <a:prstGeom prst="rect">
             <a:avLst/>
@@ -13104,8 +13104,8 @@
         </p:blipFill>
         <p:spPr>
           <a:xfrm>
-            <a:off x="2808723" y="422773"/>
-            <a:ext cx="6951474" cy="6012451"/>
+            <a:off x="2808723" y="422809"/>
+            <a:ext cx="6951474" cy="6012378"/>
           </a:xfrm>
           <a:prstGeom prst="rect">
             <a:avLst/>
@@ -13163,8 +13163,8 @@
         </p:blipFill>
         <p:spPr>
           <a:xfrm>
-            <a:off x="2797648" y="429670"/>
-            <a:ext cx="6973625" cy="5998656"/>
+            <a:off x="2797648" y="430854"/>
+            <a:ext cx="6973625" cy="5996288"/>
           </a:xfrm>
           <a:prstGeom prst="rect">
             <a:avLst/>
@@ -13222,8 +13222,8 @@
         </p:blipFill>
         <p:spPr>
           <a:xfrm>
-            <a:off x="2753119" y="394481"/>
-            <a:ext cx="7062685" cy="6069037"/>
+            <a:off x="2767288" y="394481"/>
+            <a:ext cx="7034347" cy="6069037"/>
           </a:xfrm>
           <a:prstGeom prst="rect">
             <a:avLst/>
@@ -13281,8 +13281,8 @@
         </p:blipFill>
         <p:spPr>
           <a:xfrm>
-            <a:off x="2768861" y="394481"/>
-            <a:ext cx="7031201" cy="6069037"/>
+            <a:off x="2779935" y="394481"/>
+            <a:ext cx="7009053" cy="6069037"/>
           </a:xfrm>
           <a:prstGeom prst="rect">
             <a:avLst/>
@@ -13340,8 +13340,8 @@
         </p:blipFill>
         <p:spPr>
           <a:xfrm>
-            <a:off x="2768861" y="406240"/>
-            <a:ext cx="7031201" cy="6045518"/>
+            <a:off x="2785487" y="406240"/>
+            <a:ext cx="6997948" cy="6045518"/>
           </a:xfrm>
           <a:prstGeom prst="rect">
             <a:avLst/>
@@ -13399,8 +13399,8 @@
         </p:blipFill>
         <p:spPr>
           <a:xfrm>
-            <a:off x="2768861" y="408395"/>
-            <a:ext cx="7031201" cy="6041207"/>
+            <a:off x="2784574" y="408395"/>
+            <a:ext cx="6999775" cy="6041207"/>
           </a:xfrm>
           <a:prstGeom prst="rect">
             <a:avLst/>
@@ -13458,8 +13458,8 @@
         </p:blipFill>
         <p:spPr>
           <a:xfrm>
-            <a:off x="2782410" y="422773"/>
-            <a:ext cx="7004103" cy="6012451"/>
+            <a:off x="2782410" y="429162"/>
+            <a:ext cx="7004103" cy="5999673"/>
           </a:xfrm>
           <a:prstGeom prst="rect">
             <a:avLst/>
@@ -13577,8 +13577,8 @@
         </p:blipFill>
         <p:spPr>
           <a:xfrm>
-            <a:off x="2779243" y="422773"/>
-            <a:ext cx="7010436" cy="6012451"/>
+            <a:off x="2801442" y="422773"/>
+            <a:ext cx="6966038" cy="6012451"/>
           </a:xfrm>
           <a:prstGeom prst="rect">
             <a:avLst/>
@@ -13636,8 +13636,8 @@
         </p:blipFill>
         <p:spPr>
           <a:xfrm>
-            <a:off x="2797386" y="422773"/>
-            <a:ext cx="6974149" cy="6012451"/>
+            <a:off x="2797386" y="427558"/>
+            <a:ext cx="6974149" cy="6002880"/>
           </a:xfrm>
           <a:prstGeom prst="rect">
             <a:avLst/>
@@ -13695,8 +13695,8 @@
         </p:blipFill>
         <p:spPr>
           <a:xfrm>
-            <a:off x="2753119" y="393284"/>
-            <a:ext cx="7062685" cy="6071431"/>
+            <a:off x="2753119" y="393381"/>
+            <a:ext cx="7062685" cy="6071236"/>
           </a:xfrm>
           <a:prstGeom prst="rect">
             <a:avLst/>
@@ -15417,6 +15417,15 @@
 </file>
 
 <file path=customXml/item1.xml><?xml version="1.0" encoding="utf-8"?>
+<p:properties xmlns:p="http://schemas.microsoft.com/office/2006/metadata/properties" xmlns:xsi="http://www.w3.org/2001/XMLSchema-instance" xmlns:pc="http://schemas.microsoft.com/office/infopath/2007/PartnerControls">
+  <documentManagement>
+    <Status xmlns="71af3243-3dd4-4a8d-8c0d-dd76da1f02a5">Not started</Status>
+    <MediaServiceKeyPoints xmlns="71af3243-3dd4-4a8d-8c0d-dd76da1f02a5" xsi:nil="true"/>
+  </documentManagement>
+</p:properties>
+</file>
+
+<file path=customXml/item2.xml><?xml version="1.0" encoding="utf-8"?>
 <ct:contentTypeSchema xmlns:ct="http://schemas.microsoft.com/office/2006/metadata/contentType" xmlns:ma="http://schemas.microsoft.com/office/2006/metadata/properties/metaAttributes" ct:_="" ma:_="" ma:contentTypeName="Document" ma:contentTypeID="0x01010079F111ED35F8CC479449609E8A0923A6" ma:contentTypeVersion="12" ma:contentTypeDescription="Create a new document." ma:contentTypeScope="" ma:versionID="fa6e671f1cd7e4d96ff9652be322dd5e">
   <xsd:schema xmlns:xsd="http://www.w3.org/2001/XMLSchema" xmlns:xs="http://www.w3.org/2001/XMLSchema" xmlns:p="http://schemas.microsoft.com/office/2006/metadata/properties" xmlns:ns2="71af3243-3dd4-4a8d-8c0d-dd76da1f02a5" xmlns:ns3="16c05727-aa75-4e4a-9b5f-8a80a1165891" targetNamespace="http://schemas.microsoft.com/office/2006/metadata/properties" ma:root="true" ma:fieldsID="4e2496f70b101db0b8013f30a071bbf7" ns2:_="" ns3:_="">
     <xsd:import namespace="71af3243-3dd4-4a8d-8c0d-dd76da1f02a5"/>
@@ -15637,15 +15646,6 @@
 </ct:contentTypeSchema>
 </file>
 
-<file path=customXml/item2.xml><?xml version="1.0" encoding="utf-8"?>
-<p:properties xmlns:p="http://schemas.microsoft.com/office/2006/metadata/properties" xmlns:xsi="http://www.w3.org/2001/XMLSchema-instance" xmlns:pc="http://schemas.microsoft.com/office/infopath/2007/PartnerControls">
-  <documentManagement>
-    <Status xmlns="71af3243-3dd4-4a8d-8c0d-dd76da1f02a5">Not started</Status>
-    <MediaServiceKeyPoints xmlns="71af3243-3dd4-4a8d-8c0d-dd76da1f02a5" xsi:nil="true"/>
-  </documentManagement>
-</p:properties>
-</file>
-
 <file path=customXml/item3.xml><?xml version="1.0" encoding="utf-8"?>
 <?mso-contentType ?>
 <FormTemplates xmlns="http://schemas.microsoft.com/sharepoint/v3/contenttype/forms">
@@ -15656,6 +15656,16 @@
 </file>
 
 <file path=customXml/itemProps1.xml><?xml version="1.0" encoding="utf-8"?>
+<ds:datastoreItem xmlns:ds="http://schemas.openxmlformats.org/officeDocument/2006/customXml" ds:itemID="{38F4328E-77DF-41E8-952F-124AE19F1F7C}">
+  <ds:schemaRefs>
+    <ds:schemaRef ds:uri="http://schemas.microsoft.com/office/2006/metadata/properties"/>
+    <ds:schemaRef ds:uri="http://schemas.microsoft.com/office/infopath/2007/PartnerControls"/>
+    <ds:schemaRef ds:uri="71af3243-3dd4-4a8d-8c0d-dd76da1f02a5"/>
+  </ds:schemaRefs>
+</ds:datastoreItem>
+</file>
+
+<file path=customXml/itemProps2.xml><?xml version="1.0" encoding="utf-8"?>
 <ds:datastoreItem xmlns:ds="http://schemas.openxmlformats.org/officeDocument/2006/customXml" ds:itemID="{1F2FE978-FCBC-4C90-A410-B547AA706062}">
   <ds:schemaRefs>
     <ds:schemaRef ds:uri="http://schemas.microsoft.com/office/2006/metadata/contentType"/>
@@ -15674,16 +15684,6 @@
 </ds:datastoreItem>
 </file>
 
-<file path=customXml/itemProps2.xml><?xml version="1.0" encoding="utf-8"?>
-<ds:datastoreItem xmlns:ds="http://schemas.openxmlformats.org/officeDocument/2006/customXml" ds:itemID="{38F4328E-77DF-41E8-952F-124AE19F1F7C}">
-  <ds:schemaRefs>
-    <ds:schemaRef ds:uri="http://schemas.microsoft.com/office/2006/metadata/properties"/>
-    <ds:schemaRef ds:uri="http://schemas.microsoft.com/office/infopath/2007/PartnerControls"/>
-    <ds:schemaRef ds:uri="71af3243-3dd4-4a8d-8c0d-dd76da1f02a5"/>
-  </ds:schemaRefs>
-</ds:datastoreItem>
-</file>
-
 <file path=customXml/itemProps3.xml><?xml version="1.0" encoding="utf-8"?>
 <ds:datastoreItem xmlns:ds="http://schemas.openxmlformats.org/officeDocument/2006/customXml" ds:itemID="{6A7FA506-1E93-4CA4-B270-1F08FD18C366}">
   <ds:schemaRefs>

</xml_diff>

<commit_message>
Otra actualización de la presentación
</commit_message>
<xml_diff>
--- a/Presentaciones/Presentación 3.pptx
+++ b/Presentaciones/Presentación 3.pptx
@@ -5,10 +5,10 @@
     <p:sldMasterId id="2147483779" r:id="rId4"/>
   </p:sldMasterIdLst>
   <p:notesMasterIdLst>
-    <p:notesMasterId r:id="rId46"/>
+    <p:notesMasterId r:id="rId47"/>
   </p:notesMasterIdLst>
   <p:handoutMasterIdLst>
-    <p:handoutMasterId r:id="rId47"/>
+    <p:handoutMasterId r:id="rId48"/>
   </p:handoutMasterIdLst>
   <p:sldIdLst>
     <p:sldId id="348" r:id="rId5"/>
@@ -24,34 +24,35 @@
     <p:sldId id="361" r:id="rId15"/>
     <p:sldId id="362" r:id="rId16"/>
     <p:sldId id="363" r:id="rId17"/>
-    <p:sldId id="365" r:id="rId18"/>
-    <p:sldId id="364" r:id="rId19"/>
-    <p:sldId id="366" r:id="rId20"/>
-    <p:sldId id="367" r:id="rId21"/>
-    <p:sldId id="368" r:id="rId22"/>
-    <p:sldId id="390" r:id="rId23"/>
-    <p:sldId id="389" r:id="rId24"/>
-    <p:sldId id="369" r:id="rId25"/>
-    <p:sldId id="370" r:id="rId26"/>
-    <p:sldId id="379" r:id="rId27"/>
-    <p:sldId id="380" r:id="rId28"/>
-    <p:sldId id="372" r:id="rId29"/>
-    <p:sldId id="373" r:id="rId30"/>
-    <p:sldId id="374" r:id="rId31"/>
-    <p:sldId id="375" r:id="rId32"/>
-    <p:sldId id="376" r:id="rId33"/>
-    <p:sldId id="377" r:id="rId34"/>
-    <p:sldId id="378" r:id="rId35"/>
-    <p:sldId id="371" r:id="rId36"/>
-    <p:sldId id="387" r:id="rId37"/>
-    <p:sldId id="381" r:id="rId38"/>
-    <p:sldId id="382" r:id="rId39"/>
-    <p:sldId id="383" r:id="rId40"/>
-    <p:sldId id="386" r:id="rId41"/>
-    <p:sldId id="385" r:id="rId42"/>
-    <p:sldId id="388" r:id="rId43"/>
-    <p:sldId id="384" r:id="rId44"/>
-    <p:sldId id="266" r:id="rId45"/>
+    <p:sldId id="391" r:id="rId18"/>
+    <p:sldId id="365" r:id="rId19"/>
+    <p:sldId id="364" r:id="rId20"/>
+    <p:sldId id="366" r:id="rId21"/>
+    <p:sldId id="367" r:id="rId22"/>
+    <p:sldId id="368" r:id="rId23"/>
+    <p:sldId id="390" r:id="rId24"/>
+    <p:sldId id="389" r:id="rId25"/>
+    <p:sldId id="369" r:id="rId26"/>
+    <p:sldId id="370" r:id="rId27"/>
+    <p:sldId id="379" r:id="rId28"/>
+    <p:sldId id="380" r:id="rId29"/>
+    <p:sldId id="372" r:id="rId30"/>
+    <p:sldId id="373" r:id="rId31"/>
+    <p:sldId id="374" r:id="rId32"/>
+    <p:sldId id="375" r:id="rId33"/>
+    <p:sldId id="376" r:id="rId34"/>
+    <p:sldId id="377" r:id="rId35"/>
+    <p:sldId id="378" r:id="rId36"/>
+    <p:sldId id="371" r:id="rId37"/>
+    <p:sldId id="387" r:id="rId38"/>
+    <p:sldId id="381" r:id="rId39"/>
+    <p:sldId id="382" r:id="rId40"/>
+    <p:sldId id="383" r:id="rId41"/>
+    <p:sldId id="386" r:id="rId42"/>
+    <p:sldId id="385" r:id="rId43"/>
+    <p:sldId id="388" r:id="rId44"/>
+    <p:sldId id="384" r:id="rId45"/>
+    <p:sldId id="266" r:id="rId46"/>
   </p:sldIdLst>
   <p:sldSz cx="12192000" cy="6858000"/>
   <p:notesSz cx="6858000" cy="9144000"/>
@@ -1220,7 +1221,7 @@
     </p:spTree>
     <p:extLst>
       <p:ext uri="{BB962C8B-B14F-4D97-AF65-F5344CB8AC3E}">
-        <p14:creationId xmlns:p14="http://schemas.microsoft.com/office/powerpoint/2010/main" val="710479211"/>
+        <p14:creationId xmlns:p14="http://schemas.microsoft.com/office/powerpoint/2010/main" val="2538013378"/>
       </p:ext>
     </p:extLst>
   </p:cSld>
@@ -1311,7 +1312,7 @@
     </p:spTree>
     <p:extLst>
       <p:ext uri="{BB962C8B-B14F-4D97-AF65-F5344CB8AC3E}">
-        <p14:creationId xmlns:p14="http://schemas.microsoft.com/office/powerpoint/2010/main" val="1707072479"/>
+        <p14:creationId xmlns:p14="http://schemas.microsoft.com/office/powerpoint/2010/main" val="710479211"/>
       </p:ext>
     </p:extLst>
   </p:cSld>
@@ -1402,7 +1403,7 @@
     </p:spTree>
     <p:extLst>
       <p:ext uri="{BB962C8B-B14F-4D97-AF65-F5344CB8AC3E}">
-        <p14:creationId xmlns:p14="http://schemas.microsoft.com/office/powerpoint/2010/main" val="2784990946"/>
+        <p14:creationId xmlns:p14="http://schemas.microsoft.com/office/powerpoint/2010/main" val="1707072479"/>
       </p:ext>
     </p:extLst>
   </p:cSld>
@@ -1493,7 +1494,7 @@
     </p:spTree>
     <p:extLst>
       <p:ext uri="{BB962C8B-B14F-4D97-AF65-F5344CB8AC3E}">
-        <p14:creationId xmlns:p14="http://schemas.microsoft.com/office/powerpoint/2010/main" val="3696324650"/>
+        <p14:creationId xmlns:p14="http://schemas.microsoft.com/office/powerpoint/2010/main" val="2784990946"/>
       </p:ext>
     </p:extLst>
   </p:cSld>
@@ -1584,7 +1585,7 @@
     </p:spTree>
     <p:extLst>
       <p:ext uri="{BB962C8B-B14F-4D97-AF65-F5344CB8AC3E}">
-        <p14:creationId xmlns:p14="http://schemas.microsoft.com/office/powerpoint/2010/main" val="125574142"/>
+        <p14:creationId xmlns:p14="http://schemas.microsoft.com/office/powerpoint/2010/main" val="3696324650"/>
       </p:ext>
     </p:extLst>
   </p:cSld>
@@ -1675,7 +1676,7 @@
     </p:spTree>
     <p:extLst>
       <p:ext uri="{BB962C8B-B14F-4D97-AF65-F5344CB8AC3E}">
-        <p14:creationId xmlns:p14="http://schemas.microsoft.com/office/powerpoint/2010/main" val="2824818763"/>
+        <p14:creationId xmlns:p14="http://schemas.microsoft.com/office/powerpoint/2010/main" val="125574142"/>
       </p:ext>
     </p:extLst>
   </p:cSld>
@@ -1857,7 +1858,7 @@
     </p:spTree>
     <p:extLst>
       <p:ext uri="{BB962C8B-B14F-4D97-AF65-F5344CB8AC3E}">
-        <p14:creationId xmlns:p14="http://schemas.microsoft.com/office/powerpoint/2010/main" val="3743216713"/>
+        <p14:creationId xmlns:p14="http://schemas.microsoft.com/office/powerpoint/2010/main" val="2824818763"/>
       </p:ext>
     </p:extLst>
   </p:cSld>
@@ -1948,7 +1949,7 @@
     </p:spTree>
     <p:extLst>
       <p:ext uri="{BB962C8B-B14F-4D97-AF65-F5344CB8AC3E}">
-        <p14:creationId xmlns:p14="http://schemas.microsoft.com/office/powerpoint/2010/main" val="2143953544"/>
+        <p14:creationId xmlns:p14="http://schemas.microsoft.com/office/powerpoint/2010/main" val="3743216713"/>
       </p:ext>
     </p:extLst>
   </p:cSld>
@@ -2039,7 +2040,7 @@
     </p:spTree>
     <p:extLst>
       <p:ext uri="{BB962C8B-B14F-4D97-AF65-F5344CB8AC3E}">
-        <p14:creationId xmlns:p14="http://schemas.microsoft.com/office/powerpoint/2010/main" val="1022984657"/>
+        <p14:creationId xmlns:p14="http://schemas.microsoft.com/office/powerpoint/2010/main" val="2143953544"/>
       </p:ext>
     </p:extLst>
   </p:cSld>
@@ -2130,7 +2131,7 @@
     </p:spTree>
     <p:extLst>
       <p:ext uri="{BB962C8B-B14F-4D97-AF65-F5344CB8AC3E}">
-        <p14:creationId xmlns:p14="http://schemas.microsoft.com/office/powerpoint/2010/main" val="60716112"/>
+        <p14:creationId xmlns:p14="http://schemas.microsoft.com/office/powerpoint/2010/main" val="1022984657"/>
       </p:ext>
     </p:extLst>
   </p:cSld>
@@ -2221,7 +2222,7 @@
     </p:spTree>
     <p:extLst>
       <p:ext uri="{BB962C8B-B14F-4D97-AF65-F5344CB8AC3E}">
-        <p14:creationId xmlns:p14="http://schemas.microsoft.com/office/powerpoint/2010/main" val="2123131881"/>
+        <p14:creationId xmlns:p14="http://schemas.microsoft.com/office/powerpoint/2010/main" val="60716112"/>
       </p:ext>
     </p:extLst>
   </p:cSld>
@@ -2312,7 +2313,7 @@
     </p:spTree>
     <p:extLst>
       <p:ext uri="{BB962C8B-B14F-4D97-AF65-F5344CB8AC3E}">
-        <p14:creationId xmlns:p14="http://schemas.microsoft.com/office/powerpoint/2010/main" val="53898956"/>
+        <p14:creationId xmlns:p14="http://schemas.microsoft.com/office/powerpoint/2010/main" val="2123131881"/>
       </p:ext>
     </p:extLst>
   </p:cSld>
@@ -2403,7 +2404,7 @@
     </p:spTree>
     <p:extLst>
       <p:ext uri="{BB962C8B-B14F-4D97-AF65-F5344CB8AC3E}">
-        <p14:creationId xmlns:p14="http://schemas.microsoft.com/office/powerpoint/2010/main" val="2405230230"/>
+        <p14:creationId xmlns:p14="http://schemas.microsoft.com/office/powerpoint/2010/main" val="53898956"/>
       </p:ext>
     </p:extLst>
   </p:cSld>
@@ -2494,7 +2495,7 @@
     </p:spTree>
     <p:extLst>
       <p:ext uri="{BB962C8B-B14F-4D97-AF65-F5344CB8AC3E}">
-        <p14:creationId xmlns:p14="http://schemas.microsoft.com/office/powerpoint/2010/main" val="1008257367"/>
+        <p14:creationId xmlns:p14="http://schemas.microsoft.com/office/powerpoint/2010/main" val="2405230230"/>
       </p:ext>
     </p:extLst>
   </p:cSld>
@@ -2585,7 +2586,7 @@
     </p:spTree>
     <p:extLst>
       <p:ext uri="{BB962C8B-B14F-4D97-AF65-F5344CB8AC3E}">
-        <p14:creationId xmlns:p14="http://schemas.microsoft.com/office/powerpoint/2010/main" val="3540504053"/>
+        <p14:creationId xmlns:p14="http://schemas.microsoft.com/office/powerpoint/2010/main" val="1008257367"/>
       </p:ext>
     </p:extLst>
   </p:cSld>
@@ -2676,7 +2677,7 @@
     </p:spTree>
     <p:extLst>
       <p:ext uri="{BB962C8B-B14F-4D97-AF65-F5344CB8AC3E}">
-        <p14:creationId xmlns:p14="http://schemas.microsoft.com/office/powerpoint/2010/main" val="900258581"/>
+        <p14:creationId xmlns:p14="http://schemas.microsoft.com/office/powerpoint/2010/main" val="3540504053"/>
       </p:ext>
     </p:extLst>
   </p:cSld>
@@ -2858,7 +2859,7 @@
     </p:spTree>
     <p:extLst>
       <p:ext uri="{BB962C8B-B14F-4D97-AF65-F5344CB8AC3E}">
-        <p14:creationId xmlns:p14="http://schemas.microsoft.com/office/powerpoint/2010/main" val="747918721"/>
+        <p14:creationId xmlns:p14="http://schemas.microsoft.com/office/powerpoint/2010/main" val="900258581"/>
       </p:ext>
     </p:extLst>
   </p:cSld>
@@ -2949,7 +2950,7 @@
     </p:spTree>
     <p:extLst>
       <p:ext uri="{BB962C8B-B14F-4D97-AF65-F5344CB8AC3E}">
-        <p14:creationId xmlns:p14="http://schemas.microsoft.com/office/powerpoint/2010/main" val="2770099078"/>
+        <p14:creationId xmlns:p14="http://schemas.microsoft.com/office/powerpoint/2010/main" val="747918721"/>
       </p:ext>
     </p:extLst>
   </p:cSld>
@@ -3040,7 +3041,7 @@
     </p:spTree>
     <p:extLst>
       <p:ext uri="{BB962C8B-B14F-4D97-AF65-F5344CB8AC3E}">
-        <p14:creationId xmlns:p14="http://schemas.microsoft.com/office/powerpoint/2010/main" val="2624838828"/>
+        <p14:creationId xmlns:p14="http://schemas.microsoft.com/office/powerpoint/2010/main" val="2770099078"/>
       </p:ext>
     </p:extLst>
   </p:cSld>
@@ -3131,7 +3132,7 @@
     </p:spTree>
     <p:extLst>
       <p:ext uri="{BB962C8B-B14F-4D97-AF65-F5344CB8AC3E}">
-        <p14:creationId xmlns:p14="http://schemas.microsoft.com/office/powerpoint/2010/main" val="3150881530"/>
+        <p14:creationId xmlns:p14="http://schemas.microsoft.com/office/powerpoint/2010/main" val="2624838828"/>
       </p:ext>
     </p:extLst>
   </p:cSld>
@@ -3222,7 +3223,7 @@
     </p:spTree>
     <p:extLst>
       <p:ext uri="{BB962C8B-B14F-4D97-AF65-F5344CB8AC3E}">
-        <p14:creationId xmlns:p14="http://schemas.microsoft.com/office/powerpoint/2010/main" val="464612638"/>
+        <p14:creationId xmlns:p14="http://schemas.microsoft.com/office/powerpoint/2010/main" val="3150881530"/>
       </p:ext>
     </p:extLst>
   </p:cSld>
@@ -3313,7 +3314,7 @@
     </p:spTree>
     <p:extLst>
       <p:ext uri="{BB962C8B-B14F-4D97-AF65-F5344CB8AC3E}">
-        <p14:creationId xmlns:p14="http://schemas.microsoft.com/office/powerpoint/2010/main" val="197483260"/>
+        <p14:creationId xmlns:p14="http://schemas.microsoft.com/office/powerpoint/2010/main" val="464612638"/>
       </p:ext>
     </p:extLst>
   </p:cSld>
@@ -3404,7 +3405,7 @@
     </p:spTree>
     <p:extLst>
       <p:ext uri="{BB962C8B-B14F-4D97-AF65-F5344CB8AC3E}">
-        <p14:creationId xmlns:p14="http://schemas.microsoft.com/office/powerpoint/2010/main" val="1433483113"/>
+        <p14:creationId xmlns:p14="http://schemas.microsoft.com/office/powerpoint/2010/main" val="197483260"/>
       </p:ext>
     </p:extLst>
   </p:cSld>
@@ -3495,7 +3496,7 @@
     </p:spTree>
     <p:extLst>
       <p:ext uri="{BB962C8B-B14F-4D97-AF65-F5344CB8AC3E}">
-        <p14:creationId xmlns:p14="http://schemas.microsoft.com/office/powerpoint/2010/main" val="2419501699"/>
+        <p14:creationId xmlns:p14="http://schemas.microsoft.com/office/powerpoint/2010/main" val="1433483113"/>
       </p:ext>
     </p:extLst>
   </p:cSld>
@@ -3586,7 +3587,7 @@
     </p:spTree>
     <p:extLst>
       <p:ext uri="{BB962C8B-B14F-4D97-AF65-F5344CB8AC3E}">
-        <p14:creationId xmlns:p14="http://schemas.microsoft.com/office/powerpoint/2010/main" val="2750822996"/>
+        <p14:creationId xmlns:p14="http://schemas.microsoft.com/office/powerpoint/2010/main" val="2419501699"/>
       </p:ext>
     </p:extLst>
   </p:cSld>
@@ -3677,7 +3678,7 @@
     </p:spTree>
     <p:extLst>
       <p:ext uri="{BB962C8B-B14F-4D97-AF65-F5344CB8AC3E}">
-        <p14:creationId xmlns:p14="http://schemas.microsoft.com/office/powerpoint/2010/main" val="3489256250"/>
+        <p14:creationId xmlns:p14="http://schemas.microsoft.com/office/powerpoint/2010/main" val="2750822996"/>
       </p:ext>
     </p:extLst>
   </p:cSld>
@@ -3859,7 +3860,7 @@
     </p:spTree>
     <p:extLst>
       <p:ext uri="{BB962C8B-B14F-4D97-AF65-F5344CB8AC3E}">
-        <p14:creationId xmlns:p14="http://schemas.microsoft.com/office/powerpoint/2010/main" val="3031355672"/>
+        <p14:creationId xmlns:p14="http://schemas.microsoft.com/office/powerpoint/2010/main" val="3489256250"/>
       </p:ext>
     </p:extLst>
   </p:cSld>
@@ -3888,7 +3889,7 @@
       </p:grpSpPr>
       <p:sp>
         <p:nvSpPr>
-          <p:cNvPr id="2" name="Marcador de imagen de diapositiva 1"/>
+          <p:cNvPr id="2" name="Marcador de posición de imagen de diapositiva 1"/>
           <p:cNvSpPr>
             <a:spLocks noGrp="1" noRot="1" noChangeAspect="1"/>
           </p:cNvSpPr>
@@ -3925,7 +3926,7 @@
       </p:sp>
       <p:sp>
         <p:nvSpPr>
-          <p:cNvPr id="4" name="Marcador de número de diapositiva 3"/>
+          <p:cNvPr id="4" name="Marcador de posición de número de diapositiva 3"/>
           <p:cNvSpPr>
             <a:spLocks noGrp="1"/>
           </p:cNvSpPr>
@@ -3942,6 +3943,97 @@
             <a:fld id="{34DD8812-632B-44E3-B183-D20ADC793C3A}" type="slidenum">
               <a:rPr lang="es-ES" smtClean="0"/>
               <a:t>41</a:t>
+            </a:fld>
+            <a:endParaRPr lang="es-ES" dirty="0"/>
+          </a:p>
+        </p:txBody>
+      </p:sp>
+    </p:spTree>
+    <p:extLst>
+      <p:ext uri="{BB962C8B-B14F-4D97-AF65-F5344CB8AC3E}">
+        <p14:creationId xmlns:p14="http://schemas.microsoft.com/office/powerpoint/2010/main" val="3031355672"/>
+      </p:ext>
+    </p:extLst>
+  </p:cSld>
+  <p:clrMapOvr>
+    <a:masterClrMapping/>
+  </p:clrMapOvr>
+</p:notes>
+</file>
+
+<file path=ppt/notesSlides/notesSlide42.xml><?xml version="1.0" encoding="utf-8"?>
+<p:notes xmlns:a="http://schemas.openxmlformats.org/drawingml/2006/main" xmlns:r="http://schemas.openxmlformats.org/officeDocument/2006/relationships" xmlns:p="http://schemas.openxmlformats.org/presentationml/2006/main">
+  <p:cSld>
+    <p:spTree>
+      <p:nvGrpSpPr>
+        <p:cNvPr id="1" name=""/>
+        <p:cNvGrpSpPr/>
+        <p:nvPr/>
+      </p:nvGrpSpPr>
+      <p:grpSpPr>
+        <a:xfrm>
+          <a:off x="0" y="0"/>
+          <a:ext cx="0" cy="0"/>
+          <a:chOff x="0" y="0"/>
+          <a:chExt cx="0" cy="0"/>
+        </a:xfrm>
+      </p:grpSpPr>
+      <p:sp>
+        <p:nvSpPr>
+          <p:cNvPr id="2" name="Marcador de imagen de diapositiva 1"/>
+          <p:cNvSpPr>
+            <a:spLocks noGrp="1" noRot="1" noChangeAspect="1"/>
+          </p:cNvSpPr>
+          <p:nvPr>
+            <p:ph type="sldImg"/>
+          </p:nvPr>
+        </p:nvSpPr>
+        <p:spPr>
+          <a:xfrm>
+            <a:off x="685800" y="1143000"/>
+            <a:ext cx="5486400" cy="3086100"/>
+          </a:xfrm>
+        </p:spPr>
+      </p:sp>
+      <p:sp>
+        <p:nvSpPr>
+          <p:cNvPr id="3" name="Marcador de posición de notas 2"/>
+          <p:cNvSpPr>
+            <a:spLocks noGrp="1"/>
+          </p:cNvSpPr>
+          <p:nvPr>
+            <p:ph type="body" idx="1"/>
+          </p:nvPr>
+        </p:nvSpPr>
+        <p:spPr/>
+        <p:txBody>
+          <a:bodyPr rtlCol="0"/>
+          <a:lstStyle/>
+          <a:p>
+            <a:pPr rtl="0"/>
+            <a:endParaRPr lang="es-ES" dirty="0"/>
+          </a:p>
+        </p:txBody>
+      </p:sp>
+      <p:sp>
+        <p:nvSpPr>
+          <p:cNvPr id="4" name="Marcador de número de diapositiva 3"/>
+          <p:cNvSpPr>
+            <a:spLocks noGrp="1"/>
+          </p:cNvSpPr>
+          <p:nvPr>
+            <p:ph type="sldNum" sz="quarter" idx="10"/>
+          </p:nvPr>
+        </p:nvSpPr>
+        <p:spPr/>
+        <p:txBody>
+          <a:bodyPr rtlCol="0"/>
+          <a:lstStyle/>
+          <a:p>
+            <a:pPr rtl="0"/>
+            <a:fld id="{34DD8812-632B-44E3-B183-D20ADC793C3A}" type="slidenum">
+              <a:rPr lang="es-ES" smtClean="0"/>
+              <a:t>42</a:t>
             </a:fld>
             <a:endParaRPr lang="es-ES" dirty="0"/>
           </a:p>
@@ -12444,8 +12536,8 @@
         </p:blipFill>
         <p:spPr>
           <a:xfrm>
-            <a:off x="2652008" y="365162"/>
-            <a:ext cx="7140621" cy="6146358"/>
+            <a:off x="2652008" y="389326"/>
+            <a:ext cx="7140621" cy="6098030"/>
           </a:xfrm>
           <a:prstGeom prst="rect">
             <a:avLst/>
@@ -12503,8 +12595,8 @@
         </p:blipFill>
         <p:spPr>
           <a:xfrm>
-            <a:off x="2652008" y="384315"/>
-            <a:ext cx="7140621" cy="6108050"/>
+            <a:off x="2698276" y="389326"/>
+            <a:ext cx="7048085" cy="6098030"/>
           </a:xfrm>
           <a:prstGeom prst="rect">
             <a:avLst/>
@@ -12514,7 +12606,7 @@
     </p:spTree>
     <p:extLst>
       <p:ext uri="{BB962C8B-B14F-4D97-AF65-F5344CB8AC3E}">
-        <p14:creationId xmlns:p14="http://schemas.microsoft.com/office/powerpoint/2010/main" val="4267962868"/>
+        <p14:creationId xmlns:p14="http://schemas.microsoft.com/office/powerpoint/2010/main" val="1766842094"/>
       </p:ext>
     </p:extLst>
   </p:cSld>
@@ -12562,8 +12654,8 @@
         </p:blipFill>
         <p:spPr>
           <a:xfrm>
-            <a:off x="2652008" y="373227"/>
-            <a:ext cx="7140621" cy="6130227"/>
+            <a:off x="2652008" y="384315"/>
+            <a:ext cx="7140621" cy="6108050"/>
           </a:xfrm>
           <a:prstGeom prst="rect">
             <a:avLst/>
@@ -12573,7 +12665,7 @@
     </p:spTree>
     <p:extLst>
       <p:ext uri="{BB962C8B-B14F-4D97-AF65-F5344CB8AC3E}">
-        <p14:creationId xmlns:p14="http://schemas.microsoft.com/office/powerpoint/2010/main" val="1160575925"/>
+        <p14:creationId xmlns:p14="http://schemas.microsoft.com/office/powerpoint/2010/main" val="4267962868"/>
       </p:ext>
     </p:extLst>
   </p:cSld>
@@ -12621,8 +12713,8 @@
         </p:blipFill>
         <p:spPr>
           <a:xfrm>
-            <a:off x="2653287" y="373227"/>
-            <a:ext cx="7138062" cy="6130227"/>
+            <a:off x="2652008" y="373227"/>
+            <a:ext cx="7140621" cy="6130227"/>
           </a:xfrm>
           <a:prstGeom prst="rect">
             <a:avLst/>
@@ -12632,7 +12724,7 @@
     </p:spTree>
     <p:extLst>
       <p:ext uri="{BB962C8B-B14F-4D97-AF65-F5344CB8AC3E}">
-        <p14:creationId xmlns:p14="http://schemas.microsoft.com/office/powerpoint/2010/main" val="243500346"/>
+        <p14:creationId xmlns:p14="http://schemas.microsoft.com/office/powerpoint/2010/main" val="1160575925"/>
       </p:ext>
     </p:extLst>
   </p:cSld>
@@ -12680,8 +12772,8 @@
         </p:blipFill>
         <p:spPr>
           <a:xfrm>
-            <a:off x="2680001" y="373227"/>
-            <a:ext cx="7084633" cy="6130227"/>
+            <a:off x="2653287" y="373227"/>
+            <a:ext cx="7138062" cy="6130227"/>
           </a:xfrm>
           <a:prstGeom prst="rect">
             <a:avLst/>
@@ -12691,7 +12783,7 @@
     </p:spTree>
     <p:extLst>
       <p:ext uri="{BB962C8B-B14F-4D97-AF65-F5344CB8AC3E}">
-        <p14:creationId xmlns:p14="http://schemas.microsoft.com/office/powerpoint/2010/main" val="3461711147"/>
+        <p14:creationId xmlns:p14="http://schemas.microsoft.com/office/powerpoint/2010/main" val="243500346"/>
       </p:ext>
     </p:extLst>
   </p:cSld>
@@ -12739,8 +12831,8 @@
         </p:blipFill>
         <p:spPr>
           <a:xfrm>
-            <a:off x="2672841" y="373227"/>
-            <a:ext cx="7098953" cy="6130227"/>
+            <a:off x="2680001" y="373227"/>
+            <a:ext cx="7084633" cy="6130227"/>
           </a:xfrm>
           <a:prstGeom prst="rect">
             <a:avLst/>
@@ -12750,7 +12842,7 @@
     </p:spTree>
     <p:extLst>
       <p:ext uri="{BB962C8B-B14F-4D97-AF65-F5344CB8AC3E}">
-        <p14:creationId xmlns:p14="http://schemas.microsoft.com/office/powerpoint/2010/main" val="3765867037"/>
+        <p14:creationId xmlns:p14="http://schemas.microsoft.com/office/powerpoint/2010/main" val="3461711147"/>
       </p:ext>
     </p:extLst>
   </p:cSld>
@@ -12798,8 +12890,8 @@
         </p:blipFill>
         <p:spPr>
           <a:xfrm>
-            <a:off x="2672841" y="381300"/>
-            <a:ext cx="7098953" cy="6114081"/>
+            <a:off x="2672841" y="373227"/>
+            <a:ext cx="7098953" cy="6130227"/>
           </a:xfrm>
           <a:prstGeom prst="rect">
             <a:avLst/>
@@ -12809,7 +12901,7 @@
     </p:spTree>
     <p:extLst>
       <p:ext uri="{BB962C8B-B14F-4D97-AF65-F5344CB8AC3E}">
-        <p14:creationId xmlns:p14="http://schemas.microsoft.com/office/powerpoint/2010/main" val="3415177348"/>
+        <p14:creationId xmlns:p14="http://schemas.microsoft.com/office/powerpoint/2010/main" val="3765867037"/>
       </p:ext>
     </p:extLst>
   </p:cSld>
@@ -12930,8 +13022,8 @@
         </p:blipFill>
         <p:spPr>
           <a:xfrm>
-            <a:off x="2672841" y="384788"/>
-            <a:ext cx="7098953" cy="6107105"/>
+            <a:off x="2672841" y="381300"/>
+            <a:ext cx="7098953" cy="6114081"/>
           </a:xfrm>
           <a:prstGeom prst="rect">
             <a:avLst/>
@@ -12941,7 +13033,7 @@
     </p:spTree>
     <p:extLst>
       <p:ext uri="{BB962C8B-B14F-4D97-AF65-F5344CB8AC3E}">
-        <p14:creationId xmlns:p14="http://schemas.microsoft.com/office/powerpoint/2010/main" val="2424743593"/>
+        <p14:creationId xmlns:p14="http://schemas.microsoft.com/office/powerpoint/2010/main" val="3415177348"/>
       </p:ext>
     </p:extLst>
   </p:cSld>
@@ -12952,79 +13044,6 @@
 </file>
 
 <file path=ppt/slides/slide21.xml><?xml version="1.0" encoding="utf-8"?>
-<p:sld xmlns:a="http://schemas.openxmlformats.org/drawingml/2006/main" xmlns:r="http://schemas.openxmlformats.org/officeDocument/2006/relationships" xmlns:p="http://schemas.openxmlformats.org/presentationml/2006/main">
-  <p:cSld>
-    <p:spTree>
-      <p:nvGrpSpPr>
-        <p:cNvPr id="1" name=""/>
-        <p:cNvGrpSpPr/>
-        <p:nvPr/>
-      </p:nvGrpSpPr>
-      <p:grpSpPr>
-        <a:xfrm>
-          <a:off x="0" y="0"/>
-          <a:ext cx="0" cy="0"/>
-          <a:chOff x="0" y="0"/>
-          <a:chExt cx="0" cy="0"/>
-        </a:xfrm>
-      </p:grpSpPr>
-      <p:sp>
-        <p:nvSpPr>
-          <p:cNvPr id="3" name="Marcador de texto 2">
-            <a:extLst>
-              <a:ext uri="{FF2B5EF4-FFF2-40B4-BE49-F238E27FC236}">
-                <a16:creationId xmlns:a16="http://schemas.microsoft.com/office/drawing/2014/main" id="{8CFCA704-4032-7441-8B97-38C90F96D7F8}"/>
-              </a:ext>
-            </a:extLst>
-          </p:cNvPr>
-          <p:cNvSpPr>
-            <a:spLocks noGrp="1"/>
-          </p:cNvSpPr>
-          <p:nvPr>
-            <p:ph type="body" idx="1"/>
-          </p:nvPr>
-        </p:nvSpPr>
-        <p:spPr>
-          <a:xfrm>
-            <a:off x="2311343" y="2857500"/>
-            <a:ext cx="7356255" cy="1143000"/>
-          </a:xfrm>
-        </p:spPr>
-        <p:txBody>
-          <a:bodyPr rtlCol="0">
-            <a:normAutofit lnSpcReduction="10000"/>
-          </a:bodyPr>
-          <a:lstStyle/>
-          <a:p>
-            <a:pPr rtl="0"/>
-            <a:r>
-              <a:rPr lang="es-ES" sz="3400" dirty="0"/>
-              <a:t>Vistas del administrador</a:t>
-            </a:r>
-          </a:p>
-          <a:p>
-            <a:pPr rtl="0"/>
-            <a:r>
-              <a:rPr lang="es-ES" sz="3400" dirty="0"/>
-              <a:t>De ventas</a:t>
-            </a:r>
-          </a:p>
-        </p:txBody>
-      </p:sp>
-    </p:spTree>
-    <p:extLst>
-      <p:ext uri="{BB962C8B-B14F-4D97-AF65-F5344CB8AC3E}">
-        <p14:creationId xmlns:p14="http://schemas.microsoft.com/office/powerpoint/2010/main" val="2653892621"/>
-      </p:ext>
-    </p:extLst>
-  </p:cSld>
-  <p:clrMapOvr>
-    <a:masterClrMapping/>
-  </p:clrMapOvr>
-</p:sld>
-</file>
-
-<file path=ppt/slides/slide22.xml><?xml version="1.0" encoding="utf-8"?>
 <p:sld xmlns:a="http://schemas.openxmlformats.org/drawingml/2006/main" xmlns:r="http://schemas.openxmlformats.org/officeDocument/2006/relationships" xmlns:p="http://schemas.openxmlformats.org/presentationml/2006/main">
   <p:cSld>
     <p:spTree>
@@ -13062,8 +13081,8 @@
         </p:blipFill>
         <p:spPr>
           <a:xfrm>
-            <a:off x="2753827" y="363886"/>
-            <a:ext cx="7061268" cy="6130227"/>
+            <a:off x="2672841" y="384788"/>
+            <a:ext cx="7098953" cy="6107105"/>
           </a:xfrm>
           <a:prstGeom prst="rect">
             <a:avLst/>
@@ -13073,7 +13092,80 @@
     </p:spTree>
     <p:extLst>
       <p:ext uri="{BB962C8B-B14F-4D97-AF65-F5344CB8AC3E}">
-        <p14:creationId xmlns:p14="http://schemas.microsoft.com/office/powerpoint/2010/main" val="523210099"/>
+        <p14:creationId xmlns:p14="http://schemas.microsoft.com/office/powerpoint/2010/main" val="2424743593"/>
+      </p:ext>
+    </p:extLst>
+  </p:cSld>
+  <p:clrMapOvr>
+    <a:masterClrMapping/>
+  </p:clrMapOvr>
+</p:sld>
+</file>
+
+<file path=ppt/slides/slide22.xml><?xml version="1.0" encoding="utf-8"?>
+<p:sld xmlns:a="http://schemas.openxmlformats.org/drawingml/2006/main" xmlns:r="http://schemas.openxmlformats.org/officeDocument/2006/relationships" xmlns:p="http://schemas.openxmlformats.org/presentationml/2006/main">
+  <p:cSld>
+    <p:spTree>
+      <p:nvGrpSpPr>
+        <p:cNvPr id="1" name=""/>
+        <p:cNvGrpSpPr/>
+        <p:nvPr/>
+      </p:nvGrpSpPr>
+      <p:grpSpPr>
+        <a:xfrm>
+          <a:off x="0" y="0"/>
+          <a:ext cx="0" cy="0"/>
+          <a:chOff x="0" y="0"/>
+          <a:chExt cx="0" cy="0"/>
+        </a:xfrm>
+      </p:grpSpPr>
+      <p:sp>
+        <p:nvSpPr>
+          <p:cNvPr id="3" name="Marcador de texto 2">
+            <a:extLst>
+              <a:ext uri="{FF2B5EF4-FFF2-40B4-BE49-F238E27FC236}">
+                <a16:creationId xmlns:a16="http://schemas.microsoft.com/office/drawing/2014/main" id="{8CFCA704-4032-7441-8B97-38C90F96D7F8}"/>
+              </a:ext>
+            </a:extLst>
+          </p:cNvPr>
+          <p:cNvSpPr>
+            <a:spLocks noGrp="1"/>
+          </p:cNvSpPr>
+          <p:nvPr>
+            <p:ph type="body" idx="1"/>
+          </p:nvPr>
+        </p:nvSpPr>
+        <p:spPr>
+          <a:xfrm>
+            <a:off x="2311343" y="2857500"/>
+            <a:ext cx="7356255" cy="1143000"/>
+          </a:xfrm>
+        </p:spPr>
+        <p:txBody>
+          <a:bodyPr rtlCol="0">
+            <a:normAutofit lnSpcReduction="10000"/>
+          </a:bodyPr>
+          <a:lstStyle/>
+          <a:p>
+            <a:pPr rtl="0"/>
+            <a:r>
+              <a:rPr lang="es-ES" sz="3400" dirty="0"/>
+              <a:t>Vistas del administrador</a:t>
+            </a:r>
+          </a:p>
+          <a:p>
+            <a:pPr rtl="0"/>
+            <a:r>
+              <a:rPr lang="es-ES" sz="3400" dirty="0"/>
+              <a:t>De ventas</a:t>
+            </a:r>
+          </a:p>
+        </p:txBody>
+      </p:sp>
+    </p:spTree>
+    <p:extLst>
+      <p:ext uri="{BB962C8B-B14F-4D97-AF65-F5344CB8AC3E}">
+        <p14:creationId xmlns:p14="http://schemas.microsoft.com/office/powerpoint/2010/main" val="2653892621"/>
       </p:ext>
     </p:extLst>
   </p:cSld>
@@ -13121,8 +13213,8 @@
         </p:blipFill>
         <p:spPr>
           <a:xfrm>
-            <a:off x="2808723" y="422809"/>
-            <a:ext cx="6951474" cy="6012378"/>
+            <a:off x="2753827" y="363886"/>
+            <a:ext cx="7061268" cy="6130227"/>
           </a:xfrm>
           <a:prstGeom prst="rect">
             <a:avLst/>
@@ -13132,7 +13224,7 @@
     </p:spTree>
     <p:extLst>
       <p:ext uri="{BB962C8B-B14F-4D97-AF65-F5344CB8AC3E}">
-        <p14:creationId xmlns:p14="http://schemas.microsoft.com/office/powerpoint/2010/main" val="2627197993"/>
+        <p14:creationId xmlns:p14="http://schemas.microsoft.com/office/powerpoint/2010/main" val="523210099"/>
       </p:ext>
     </p:extLst>
   </p:cSld>
@@ -13180,8 +13272,8 @@
         </p:blipFill>
         <p:spPr>
           <a:xfrm>
-            <a:off x="2797648" y="430854"/>
-            <a:ext cx="6973625" cy="5996288"/>
+            <a:off x="2808723" y="422809"/>
+            <a:ext cx="6951474" cy="6012378"/>
           </a:xfrm>
           <a:prstGeom prst="rect">
             <a:avLst/>
@@ -13191,7 +13283,7 @@
     </p:spTree>
     <p:extLst>
       <p:ext uri="{BB962C8B-B14F-4D97-AF65-F5344CB8AC3E}">
-        <p14:creationId xmlns:p14="http://schemas.microsoft.com/office/powerpoint/2010/main" val="976885023"/>
+        <p14:creationId xmlns:p14="http://schemas.microsoft.com/office/powerpoint/2010/main" val="2627197993"/>
       </p:ext>
     </p:extLst>
   </p:cSld>
@@ -13239,8 +13331,8 @@
         </p:blipFill>
         <p:spPr>
           <a:xfrm>
-            <a:off x="2767288" y="394481"/>
-            <a:ext cx="7034347" cy="6069037"/>
+            <a:off x="2797648" y="430854"/>
+            <a:ext cx="6973625" cy="5996288"/>
           </a:xfrm>
           <a:prstGeom prst="rect">
             <a:avLst/>
@@ -13250,7 +13342,7 @@
     </p:spTree>
     <p:extLst>
       <p:ext uri="{BB962C8B-B14F-4D97-AF65-F5344CB8AC3E}">
-        <p14:creationId xmlns:p14="http://schemas.microsoft.com/office/powerpoint/2010/main" val="371970909"/>
+        <p14:creationId xmlns:p14="http://schemas.microsoft.com/office/powerpoint/2010/main" val="976885023"/>
       </p:ext>
     </p:extLst>
   </p:cSld>
@@ -13298,8 +13390,8 @@
         </p:blipFill>
         <p:spPr>
           <a:xfrm>
-            <a:off x="2779935" y="394481"/>
-            <a:ext cx="7009053" cy="6069037"/>
+            <a:off x="2767288" y="394481"/>
+            <a:ext cx="7034347" cy="6069037"/>
           </a:xfrm>
           <a:prstGeom prst="rect">
             <a:avLst/>
@@ -13309,7 +13401,7 @@
     </p:spTree>
     <p:extLst>
       <p:ext uri="{BB962C8B-B14F-4D97-AF65-F5344CB8AC3E}">
-        <p14:creationId xmlns:p14="http://schemas.microsoft.com/office/powerpoint/2010/main" val="205002862"/>
+        <p14:creationId xmlns:p14="http://schemas.microsoft.com/office/powerpoint/2010/main" val="371970909"/>
       </p:ext>
     </p:extLst>
   </p:cSld>
@@ -13357,8 +13449,8 @@
         </p:blipFill>
         <p:spPr>
           <a:xfrm>
-            <a:off x="2785487" y="406240"/>
-            <a:ext cx="6997948" cy="6045518"/>
+            <a:off x="2779935" y="394481"/>
+            <a:ext cx="7009053" cy="6069037"/>
           </a:xfrm>
           <a:prstGeom prst="rect">
             <a:avLst/>
@@ -13368,7 +13460,7 @@
     </p:spTree>
     <p:extLst>
       <p:ext uri="{BB962C8B-B14F-4D97-AF65-F5344CB8AC3E}">
-        <p14:creationId xmlns:p14="http://schemas.microsoft.com/office/powerpoint/2010/main" val="337925173"/>
+        <p14:creationId xmlns:p14="http://schemas.microsoft.com/office/powerpoint/2010/main" val="205002862"/>
       </p:ext>
     </p:extLst>
   </p:cSld>
@@ -13416,8 +13508,8 @@
         </p:blipFill>
         <p:spPr>
           <a:xfrm>
-            <a:off x="2784574" y="408395"/>
-            <a:ext cx="6999775" cy="6041207"/>
+            <a:off x="2785487" y="406240"/>
+            <a:ext cx="6997948" cy="6045518"/>
           </a:xfrm>
           <a:prstGeom prst="rect">
             <a:avLst/>
@@ -13427,7 +13519,7 @@
     </p:spTree>
     <p:extLst>
       <p:ext uri="{BB962C8B-B14F-4D97-AF65-F5344CB8AC3E}">
-        <p14:creationId xmlns:p14="http://schemas.microsoft.com/office/powerpoint/2010/main" val="2018986868"/>
+        <p14:creationId xmlns:p14="http://schemas.microsoft.com/office/powerpoint/2010/main" val="337925173"/>
       </p:ext>
     </p:extLst>
   </p:cSld>
@@ -13475,8 +13567,8 @@
         </p:blipFill>
         <p:spPr>
           <a:xfrm>
-            <a:off x="2782410" y="429162"/>
-            <a:ext cx="7004103" cy="5999673"/>
+            <a:off x="2784574" y="408395"/>
+            <a:ext cx="6999775" cy="6041207"/>
           </a:xfrm>
           <a:prstGeom prst="rect">
             <a:avLst/>
@@ -13486,7 +13578,7 @@
     </p:spTree>
     <p:extLst>
       <p:ext uri="{BB962C8B-B14F-4D97-AF65-F5344CB8AC3E}">
-        <p14:creationId xmlns:p14="http://schemas.microsoft.com/office/powerpoint/2010/main" val="1528285714"/>
+        <p14:creationId xmlns:p14="http://schemas.microsoft.com/office/powerpoint/2010/main" val="2018986868"/>
       </p:ext>
     </p:extLst>
   </p:cSld>
@@ -13594,8 +13686,8 @@
         </p:blipFill>
         <p:spPr>
           <a:xfrm>
-            <a:off x="2801442" y="422773"/>
-            <a:ext cx="6966038" cy="6012451"/>
+            <a:off x="2782410" y="429162"/>
+            <a:ext cx="7004103" cy="5999673"/>
           </a:xfrm>
           <a:prstGeom prst="rect">
             <a:avLst/>
@@ -13605,7 +13697,7 @@
     </p:spTree>
     <p:extLst>
       <p:ext uri="{BB962C8B-B14F-4D97-AF65-F5344CB8AC3E}">
-        <p14:creationId xmlns:p14="http://schemas.microsoft.com/office/powerpoint/2010/main" val="2970123461"/>
+        <p14:creationId xmlns:p14="http://schemas.microsoft.com/office/powerpoint/2010/main" val="1528285714"/>
       </p:ext>
     </p:extLst>
   </p:cSld>
@@ -13653,8 +13745,8 @@
         </p:blipFill>
         <p:spPr>
           <a:xfrm>
-            <a:off x="2797386" y="427558"/>
-            <a:ext cx="6974149" cy="6002880"/>
+            <a:off x="2801442" y="422773"/>
+            <a:ext cx="6966038" cy="6012451"/>
           </a:xfrm>
           <a:prstGeom prst="rect">
             <a:avLst/>
@@ -13664,7 +13756,7 @@
     </p:spTree>
     <p:extLst>
       <p:ext uri="{BB962C8B-B14F-4D97-AF65-F5344CB8AC3E}">
-        <p14:creationId xmlns:p14="http://schemas.microsoft.com/office/powerpoint/2010/main" val="1710452337"/>
+        <p14:creationId xmlns:p14="http://schemas.microsoft.com/office/powerpoint/2010/main" val="2970123461"/>
       </p:ext>
     </p:extLst>
   </p:cSld>
@@ -13712,8 +13804,8 @@
         </p:blipFill>
         <p:spPr>
           <a:xfrm>
-            <a:off x="2753119" y="393381"/>
-            <a:ext cx="7062685" cy="6071236"/>
+            <a:off x="2797386" y="427558"/>
+            <a:ext cx="6974149" cy="6002880"/>
           </a:xfrm>
           <a:prstGeom prst="rect">
             <a:avLst/>
@@ -13723,7 +13815,7 @@
     </p:spTree>
     <p:extLst>
       <p:ext uri="{BB962C8B-B14F-4D97-AF65-F5344CB8AC3E}">
-        <p14:creationId xmlns:p14="http://schemas.microsoft.com/office/powerpoint/2010/main" val="1906687433"/>
+        <p14:creationId xmlns:p14="http://schemas.microsoft.com/office/powerpoint/2010/main" val="1710452337"/>
       </p:ext>
     </p:extLst>
   </p:cSld>
@@ -13771,8 +13863,8 @@
         </p:blipFill>
         <p:spPr>
           <a:xfrm>
-            <a:off x="2757917" y="393284"/>
-            <a:ext cx="7053089" cy="6071431"/>
+            <a:off x="2753119" y="393381"/>
+            <a:ext cx="7062685" cy="6071236"/>
           </a:xfrm>
           <a:prstGeom prst="rect">
             <a:avLst/>
@@ -13782,7 +13874,7 @@
     </p:spTree>
     <p:extLst>
       <p:ext uri="{BB962C8B-B14F-4D97-AF65-F5344CB8AC3E}">
-        <p14:creationId xmlns:p14="http://schemas.microsoft.com/office/powerpoint/2010/main" val="3207562424"/>
+        <p14:creationId xmlns:p14="http://schemas.microsoft.com/office/powerpoint/2010/main" val="1906687433"/>
       </p:ext>
     </p:extLst>
   </p:cSld>
@@ -13793,79 +13885,6 @@
 </file>
 
 <file path=ppt/slides/slide34.xml><?xml version="1.0" encoding="utf-8"?>
-<p:sld xmlns:a="http://schemas.openxmlformats.org/drawingml/2006/main" xmlns:r="http://schemas.openxmlformats.org/officeDocument/2006/relationships" xmlns:p="http://schemas.openxmlformats.org/presentationml/2006/main">
-  <p:cSld>
-    <p:spTree>
-      <p:nvGrpSpPr>
-        <p:cNvPr id="1" name=""/>
-        <p:cNvGrpSpPr/>
-        <p:nvPr/>
-      </p:nvGrpSpPr>
-      <p:grpSpPr>
-        <a:xfrm>
-          <a:off x="0" y="0"/>
-          <a:ext cx="0" cy="0"/>
-          <a:chOff x="0" y="0"/>
-          <a:chExt cx="0" cy="0"/>
-        </a:xfrm>
-      </p:grpSpPr>
-      <p:sp>
-        <p:nvSpPr>
-          <p:cNvPr id="3" name="Marcador de texto 2">
-            <a:extLst>
-              <a:ext uri="{FF2B5EF4-FFF2-40B4-BE49-F238E27FC236}">
-                <a16:creationId xmlns:a16="http://schemas.microsoft.com/office/drawing/2014/main" id="{8CFCA704-4032-7441-8B97-38C90F96D7F8}"/>
-              </a:ext>
-            </a:extLst>
-          </p:cNvPr>
-          <p:cNvSpPr>
-            <a:spLocks noGrp="1"/>
-          </p:cNvSpPr>
-          <p:nvPr>
-            <p:ph type="body" idx="1"/>
-          </p:nvPr>
-        </p:nvSpPr>
-        <p:spPr>
-          <a:xfrm>
-            <a:off x="2311343" y="2857500"/>
-            <a:ext cx="7356255" cy="1143000"/>
-          </a:xfrm>
-        </p:spPr>
-        <p:txBody>
-          <a:bodyPr rtlCol="0">
-            <a:normAutofit lnSpcReduction="10000"/>
-          </a:bodyPr>
-          <a:lstStyle/>
-          <a:p>
-            <a:pPr rtl="0"/>
-            <a:r>
-              <a:rPr lang="es-ES" sz="3400" dirty="0"/>
-              <a:t>Vistas del RESTO DE </a:t>
-            </a:r>
-          </a:p>
-          <a:p>
-            <a:pPr rtl="0"/>
-            <a:r>
-              <a:rPr lang="es-ES" sz="3400" dirty="0"/>
-              <a:t>EMPLEADOS</a:t>
-            </a:r>
-          </a:p>
-        </p:txBody>
-      </p:sp>
-    </p:spTree>
-    <p:extLst>
-      <p:ext uri="{BB962C8B-B14F-4D97-AF65-F5344CB8AC3E}">
-        <p14:creationId xmlns:p14="http://schemas.microsoft.com/office/powerpoint/2010/main" val="669424230"/>
-      </p:ext>
-    </p:extLst>
-  </p:cSld>
-  <p:clrMapOvr>
-    <a:masterClrMapping/>
-  </p:clrMapOvr>
-</p:sld>
-</file>
-
-<file path=ppt/slides/slide35.xml><?xml version="1.0" encoding="utf-8"?>
 <p:sld xmlns:a="http://schemas.openxmlformats.org/drawingml/2006/main" xmlns:r="http://schemas.openxmlformats.org/officeDocument/2006/relationships" xmlns:p="http://schemas.openxmlformats.org/presentationml/2006/main">
   <p:cSld>
     <p:spTree>
@@ -13903,8 +13922,8 @@
         </p:blipFill>
         <p:spPr>
           <a:xfrm>
-            <a:off x="2757512" y="393284"/>
-            <a:ext cx="7053899" cy="6071431"/>
+            <a:off x="2757917" y="393284"/>
+            <a:ext cx="7053089" cy="6071431"/>
           </a:xfrm>
           <a:prstGeom prst="rect">
             <a:avLst/>
@@ -13914,7 +13933,80 @@
     </p:spTree>
     <p:extLst>
       <p:ext uri="{BB962C8B-B14F-4D97-AF65-F5344CB8AC3E}">
-        <p14:creationId xmlns:p14="http://schemas.microsoft.com/office/powerpoint/2010/main" val="684427849"/>
+        <p14:creationId xmlns:p14="http://schemas.microsoft.com/office/powerpoint/2010/main" val="3207562424"/>
+      </p:ext>
+    </p:extLst>
+  </p:cSld>
+  <p:clrMapOvr>
+    <a:masterClrMapping/>
+  </p:clrMapOvr>
+</p:sld>
+</file>
+
+<file path=ppt/slides/slide35.xml><?xml version="1.0" encoding="utf-8"?>
+<p:sld xmlns:a="http://schemas.openxmlformats.org/drawingml/2006/main" xmlns:r="http://schemas.openxmlformats.org/officeDocument/2006/relationships" xmlns:p="http://schemas.openxmlformats.org/presentationml/2006/main">
+  <p:cSld>
+    <p:spTree>
+      <p:nvGrpSpPr>
+        <p:cNvPr id="1" name=""/>
+        <p:cNvGrpSpPr/>
+        <p:nvPr/>
+      </p:nvGrpSpPr>
+      <p:grpSpPr>
+        <a:xfrm>
+          <a:off x="0" y="0"/>
+          <a:ext cx="0" cy="0"/>
+          <a:chOff x="0" y="0"/>
+          <a:chExt cx="0" cy="0"/>
+        </a:xfrm>
+      </p:grpSpPr>
+      <p:sp>
+        <p:nvSpPr>
+          <p:cNvPr id="3" name="Marcador de texto 2">
+            <a:extLst>
+              <a:ext uri="{FF2B5EF4-FFF2-40B4-BE49-F238E27FC236}">
+                <a16:creationId xmlns:a16="http://schemas.microsoft.com/office/drawing/2014/main" id="{8CFCA704-4032-7441-8B97-38C90F96D7F8}"/>
+              </a:ext>
+            </a:extLst>
+          </p:cNvPr>
+          <p:cNvSpPr>
+            <a:spLocks noGrp="1"/>
+          </p:cNvSpPr>
+          <p:nvPr>
+            <p:ph type="body" idx="1"/>
+          </p:nvPr>
+        </p:nvSpPr>
+        <p:spPr>
+          <a:xfrm>
+            <a:off x="2311343" y="2857500"/>
+            <a:ext cx="7356255" cy="1143000"/>
+          </a:xfrm>
+        </p:spPr>
+        <p:txBody>
+          <a:bodyPr rtlCol="0">
+            <a:normAutofit lnSpcReduction="10000"/>
+          </a:bodyPr>
+          <a:lstStyle/>
+          <a:p>
+            <a:pPr rtl="0"/>
+            <a:r>
+              <a:rPr lang="es-ES" sz="3400" dirty="0"/>
+              <a:t>Vistas del RESTO DE </a:t>
+            </a:r>
+          </a:p>
+          <a:p>
+            <a:pPr rtl="0"/>
+            <a:r>
+              <a:rPr lang="es-ES" sz="3400" dirty="0"/>
+              <a:t>EMPLEADOS</a:t>
+            </a:r>
+          </a:p>
+        </p:txBody>
+      </p:sp>
+    </p:spTree>
+    <p:extLst>
+      <p:ext uri="{BB962C8B-B14F-4D97-AF65-F5344CB8AC3E}">
+        <p14:creationId xmlns:p14="http://schemas.microsoft.com/office/powerpoint/2010/main" val="669424230"/>
       </p:ext>
     </p:extLst>
   </p:cSld>
@@ -13962,8 +14054,8 @@
         </p:blipFill>
         <p:spPr>
           <a:xfrm>
-            <a:off x="2757512" y="402686"/>
-            <a:ext cx="7053899" cy="6052627"/>
+            <a:off x="2757512" y="393284"/>
+            <a:ext cx="7053899" cy="6071431"/>
           </a:xfrm>
           <a:prstGeom prst="rect">
             <a:avLst/>
@@ -13973,7 +14065,7 @@
     </p:spTree>
     <p:extLst>
       <p:ext uri="{BB962C8B-B14F-4D97-AF65-F5344CB8AC3E}">
-        <p14:creationId xmlns:p14="http://schemas.microsoft.com/office/powerpoint/2010/main" val="3395427336"/>
+        <p14:creationId xmlns:p14="http://schemas.microsoft.com/office/powerpoint/2010/main" val="684427849"/>
       </p:ext>
     </p:extLst>
   </p:cSld>
@@ -14021,8 +14113,8 @@
         </p:blipFill>
         <p:spPr>
           <a:xfrm>
-            <a:off x="2757512" y="403485"/>
-            <a:ext cx="7053899" cy="6051028"/>
+            <a:off x="2757512" y="402686"/>
+            <a:ext cx="7053899" cy="6052627"/>
           </a:xfrm>
           <a:prstGeom prst="rect">
             <a:avLst/>
@@ -14032,7 +14124,7 @@
     </p:spTree>
     <p:extLst>
       <p:ext uri="{BB962C8B-B14F-4D97-AF65-F5344CB8AC3E}">
-        <p14:creationId xmlns:p14="http://schemas.microsoft.com/office/powerpoint/2010/main" val="2742872185"/>
+        <p14:creationId xmlns:p14="http://schemas.microsoft.com/office/powerpoint/2010/main" val="3395427336"/>
       </p:ext>
     </p:extLst>
   </p:cSld>
@@ -14080,8 +14172,8 @@
         </p:blipFill>
         <p:spPr>
           <a:xfrm>
-            <a:off x="2768435" y="402686"/>
-            <a:ext cx="7032052" cy="6052627"/>
+            <a:off x="2757512" y="403485"/>
+            <a:ext cx="7053899" cy="6051028"/>
           </a:xfrm>
           <a:prstGeom prst="rect">
             <a:avLst/>
@@ -14091,7 +14183,7 @@
     </p:spTree>
     <p:extLst>
       <p:ext uri="{BB962C8B-B14F-4D97-AF65-F5344CB8AC3E}">
-        <p14:creationId xmlns:p14="http://schemas.microsoft.com/office/powerpoint/2010/main" val="4250250120"/>
+        <p14:creationId xmlns:p14="http://schemas.microsoft.com/office/powerpoint/2010/main" val="2742872185"/>
       </p:ext>
     </p:extLst>
   </p:cSld>
@@ -14139,8 +14231,8 @@
         </p:blipFill>
         <p:spPr>
           <a:xfrm>
-            <a:off x="2759658" y="421472"/>
-            <a:ext cx="7049606" cy="6015054"/>
+            <a:off x="2768435" y="402686"/>
+            <a:ext cx="7032052" cy="6052627"/>
           </a:xfrm>
           <a:prstGeom prst="rect">
             <a:avLst/>
@@ -14150,7 +14242,7 @@
     </p:spTree>
     <p:extLst>
       <p:ext uri="{BB962C8B-B14F-4D97-AF65-F5344CB8AC3E}">
-        <p14:creationId xmlns:p14="http://schemas.microsoft.com/office/powerpoint/2010/main" val="173382937"/>
+        <p14:creationId xmlns:p14="http://schemas.microsoft.com/office/powerpoint/2010/main" val="4250250120"/>
       </p:ext>
     </p:extLst>
   </p:cSld>
@@ -14257,6 +14349,65 @@
         </p:blipFill>
         <p:spPr>
           <a:xfrm>
+            <a:off x="2759658" y="421472"/>
+            <a:ext cx="7049606" cy="6015054"/>
+          </a:xfrm>
+          <a:prstGeom prst="rect">
+            <a:avLst/>
+          </a:prstGeom>
+        </p:spPr>
+      </p:pic>
+    </p:spTree>
+    <p:extLst>
+      <p:ext uri="{BB962C8B-B14F-4D97-AF65-F5344CB8AC3E}">
+        <p14:creationId xmlns:p14="http://schemas.microsoft.com/office/powerpoint/2010/main" val="173382937"/>
+      </p:ext>
+    </p:extLst>
+  </p:cSld>
+  <p:clrMapOvr>
+    <a:masterClrMapping/>
+  </p:clrMapOvr>
+</p:sld>
+</file>
+
+<file path=ppt/slides/slide41.xml><?xml version="1.0" encoding="utf-8"?>
+<p:sld xmlns:a="http://schemas.openxmlformats.org/drawingml/2006/main" xmlns:r="http://schemas.openxmlformats.org/officeDocument/2006/relationships" xmlns:p="http://schemas.openxmlformats.org/presentationml/2006/main">
+  <p:cSld>
+    <p:spTree>
+      <p:nvGrpSpPr>
+        <p:cNvPr id="1" name=""/>
+        <p:cNvGrpSpPr/>
+        <p:nvPr/>
+      </p:nvGrpSpPr>
+      <p:grpSpPr>
+        <a:xfrm>
+          <a:off x="0" y="0"/>
+          <a:ext cx="0" cy="0"/>
+          <a:chOff x="0" y="0"/>
+          <a:chExt cx="0" cy="0"/>
+        </a:xfrm>
+      </p:grpSpPr>
+      <p:pic>
+        <p:nvPicPr>
+          <p:cNvPr id="10" name="Imagen 9">
+            <a:extLst>
+              <a:ext uri="{FF2B5EF4-FFF2-40B4-BE49-F238E27FC236}">
+                <a16:creationId xmlns:a16="http://schemas.microsoft.com/office/drawing/2014/main" id="{9DC74042-7EB4-4191-879A-C41F025E92F9}"/>
+              </a:ext>
+            </a:extLst>
+          </p:cNvPr>
+          <p:cNvPicPr>
+            <a:picLocks noChangeAspect="1"/>
+          </p:cNvPicPr>
+          <p:nvPr/>
+        </p:nvPicPr>
+        <p:blipFill>
+          <a:blip r:embed="rId3"/>
+          <a:srcRect/>
+          <a:stretch/>
+        </p:blipFill>
+        <p:spPr>
+          <a:xfrm>
             <a:off x="2759658" y="393284"/>
             <a:ext cx="7049606" cy="6071431"/>
           </a:xfrm>
@@ -14278,7 +14429,7 @@
 </p:sld>
 </file>
 
-<file path=ppt/slides/slide41.xml><?xml version="1.0" encoding="utf-8"?>
+<file path=ppt/slides/slide42.xml><?xml version="1.0" encoding="utf-8"?>
 <p:sld xmlns:a="http://schemas.openxmlformats.org/drawingml/2006/main" xmlns:r="http://schemas.openxmlformats.org/officeDocument/2006/relationships" xmlns:p="http://schemas.openxmlformats.org/presentationml/2006/main">
   <p:cSld>
     <p:spTree>
@@ -15434,6 +15585,15 @@
 </file>
 
 <file path=customXml/item1.xml><?xml version="1.0" encoding="utf-8"?>
+<?mso-contentType ?>
+<FormTemplates xmlns="http://schemas.microsoft.com/sharepoint/v3/contenttype/forms">
+  <Display>DocumentLibraryForm</Display>
+  <Edit>DocumentLibraryForm</Edit>
+  <New>DocumentLibraryForm</New>
+</FormTemplates>
+</file>
+
+<file path=customXml/item2.xml><?xml version="1.0" encoding="utf-8"?>
 <ct:contentTypeSchema xmlns:ct="http://schemas.microsoft.com/office/2006/metadata/contentType" xmlns:ma="http://schemas.microsoft.com/office/2006/metadata/properties/metaAttributes" ct:_="" ma:_="" ma:contentTypeName="Document" ma:contentTypeID="0x01010079F111ED35F8CC479449609E8A0923A6" ma:contentTypeVersion="12" ma:contentTypeDescription="Create a new document." ma:contentTypeScope="" ma:versionID="fa6e671f1cd7e4d96ff9652be322dd5e">
   <xsd:schema xmlns:xsd="http://www.w3.org/2001/XMLSchema" xmlns:xs="http://www.w3.org/2001/XMLSchema" xmlns:p="http://schemas.microsoft.com/office/2006/metadata/properties" xmlns:ns2="71af3243-3dd4-4a8d-8c0d-dd76da1f02a5" xmlns:ns3="16c05727-aa75-4e4a-9b5f-8a80a1165891" targetNamespace="http://schemas.microsoft.com/office/2006/metadata/properties" ma:root="true" ma:fieldsID="4e2496f70b101db0b8013f30a071bbf7" ns2:_="" ns3:_="">
     <xsd:import namespace="71af3243-3dd4-4a8d-8c0d-dd76da1f02a5"/>
@@ -15654,15 +15814,6 @@
 </ct:contentTypeSchema>
 </file>
 
-<file path=customXml/item2.xml><?xml version="1.0" encoding="utf-8"?>
-<?mso-contentType ?>
-<FormTemplates xmlns="http://schemas.microsoft.com/sharepoint/v3/contenttype/forms">
-  <Display>DocumentLibraryForm</Display>
-  <Edit>DocumentLibraryForm</Edit>
-  <New>DocumentLibraryForm</New>
-</FormTemplates>
-</file>
-
 <file path=customXml/item3.xml><?xml version="1.0" encoding="utf-8"?>
 <p:properties xmlns:p="http://schemas.microsoft.com/office/2006/metadata/properties" xmlns:xsi="http://www.w3.org/2001/XMLSchema-instance" xmlns:pc="http://schemas.microsoft.com/office/infopath/2007/PartnerControls">
   <documentManagement>
@@ -15673,6 +15824,14 @@
 </file>
 
 <file path=customXml/itemProps1.xml><?xml version="1.0" encoding="utf-8"?>
+<ds:datastoreItem xmlns:ds="http://schemas.openxmlformats.org/officeDocument/2006/customXml" ds:itemID="{6A7FA506-1E93-4CA4-B270-1F08FD18C366}">
+  <ds:schemaRefs>
+    <ds:schemaRef ds:uri="http://schemas.microsoft.com/sharepoint/v3/contenttype/forms"/>
+  </ds:schemaRefs>
+</ds:datastoreItem>
+</file>
+
+<file path=customXml/itemProps2.xml><?xml version="1.0" encoding="utf-8"?>
 <ds:datastoreItem xmlns:ds="http://schemas.openxmlformats.org/officeDocument/2006/customXml" ds:itemID="{1F2FE978-FCBC-4C90-A410-B547AA706062}">
   <ds:schemaRefs>
     <ds:schemaRef ds:uri="http://schemas.microsoft.com/office/2006/metadata/contentType"/>
@@ -15691,14 +15850,6 @@
 </ds:datastoreItem>
 </file>
 
-<file path=customXml/itemProps2.xml><?xml version="1.0" encoding="utf-8"?>
-<ds:datastoreItem xmlns:ds="http://schemas.openxmlformats.org/officeDocument/2006/customXml" ds:itemID="{6A7FA506-1E93-4CA4-B270-1F08FD18C366}">
-  <ds:schemaRefs>
-    <ds:schemaRef ds:uri="http://schemas.microsoft.com/sharepoint/v3/contenttype/forms"/>
-  </ds:schemaRefs>
-</ds:datastoreItem>
-</file>
-
 <file path=customXml/itemProps3.xml><?xml version="1.0" encoding="utf-8"?>
 <ds:datastoreItem xmlns:ds="http://schemas.openxmlformats.org/officeDocument/2006/customXml" ds:itemID="{38F4328E-77DF-41E8-952F-124AE19F1F7C}">
   <ds:schemaRefs>

</xml_diff>

<commit_message>
Última actualización de presentación
</commit_message>
<xml_diff>
--- a/Presentaciones/Presentación 3.pptx
+++ b/Presentaciones/Presentación 3.pptx
@@ -12595,8 +12595,8 @@
         </p:blipFill>
         <p:spPr>
           <a:xfrm>
-            <a:off x="2698276" y="389326"/>
-            <a:ext cx="7048085" cy="6098030"/>
+            <a:off x="2698276" y="436514"/>
+            <a:ext cx="7048085" cy="6003653"/>
           </a:xfrm>
           <a:prstGeom prst="rect">
             <a:avLst/>
@@ -15585,15 +15585,6 @@
 </file>
 
 <file path=customXml/item1.xml><?xml version="1.0" encoding="utf-8"?>
-<?mso-contentType ?>
-<FormTemplates xmlns="http://schemas.microsoft.com/sharepoint/v3/contenttype/forms">
-  <Display>DocumentLibraryForm</Display>
-  <Edit>DocumentLibraryForm</Edit>
-  <New>DocumentLibraryForm</New>
-</FormTemplates>
-</file>
-
-<file path=customXml/item2.xml><?xml version="1.0" encoding="utf-8"?>
 <ct:contentTypeSchema xmlns:ct="http://schemas.microsoft.com/office/2006/metadata/contentType" xmlns:ma="http://schemas.microsoft.com/office/2006/metadata/properties/metaAttributes" ct:_="" ma:_="" ma:contentTypeName="Document" ma:contentTypeID="0x01010079F111ED35F8CC479449609E8A0923A6" ma:contentTypeVersion="12" ma:contentTypeDescription="Create a new document." ma:contentTypeScope="" ma:versionID="fa6e671f1cd7e4d96ff9652be322dd5e">
   <xsd:schema xmlns:xsd="http://www.w3.org/2001/XMLSchema" xmlns:xs="http://www.w3.org/2001/XMLSchema" xmlns:p="http://schemas.microsoft.com/office/2006/metadata/properties" xmlns:ns2="71af3243-3dd4-4a8d-8c0d-dd76da1f02a5" xmlns:ns3="16c05727-aa75-4e4a-9b5f-8a80a1165891" targetNamespace="http://schemas.microsoft.com/office/2006/metadata/properties" ma:root="true" ma:fieldsID="4e2496f70b101db0b8013f30a071bbf7" ns2:_="" ns3:_="">
     <xsd:import namespace="71af3243-3dd4-4a8d-8c0d-dd76da1f02a5"/>
@@ -15814,6 +15805,15 @@
 </ct:contentTypeSchema>
 </file>
 
+<file path=customXml/item2.xml><?xml version="1.0" encoding="utf-8"?>
+<?mso-contentType ?>
+<FormTemplates xmlns="http://schemas.microsoft.com/sharepoint/v3/contenttype/forms">
+  <Display>DocumentLibraryForm</Display>
+  <Edit>DocumentLibraryForm</Edit>
+  <New>DocumentLibraryForm</New>
+</FormTemplates>
+</file>
+
 <file path=customXml/item3.xml><?xml version="1.0" encoding="utf-8"?>
 <p:properties xmlns:p="http://schemas.microsoft.com/office/2006/metadata/properties" xmlns:xsi="http://www.w3.org/2001/XMLSchema-instance" xmlns:pc="http://schemas.microsoft.com/office/infopath/2007/PartnerControls">
   <documentManagement>
@@ -15824,14 +15824,6 @@
 </file>
 
 <file path=customXml/itemProps1.xml><?xml version="1.0" encoding="utf-8"?>
-<ds:datastoreItem xmlns:ds="http://schemas.openxmlformats.org/officeDocument/2006/customXml" ds:itemID="{6A7FA506-1E93-4CA4-B270-1F08FD18C366}">
-  <ds:schemaRefs>
-    <ds:schemaRef ds:uri="http://schemas.microsoft.com/sharepoint/v3/contenttype/forms"/>
-  </ds:schemaRefs>
-</ds:datastoreItem>
-</file>
-
-<file path=customXml/itemProps2.xml><?xml version="1.0" encoding="utf-8"?>
 <ds:datastoreItem xmlns:ds="http://schemas.openxmlformats.org/officeDocument/2006/customXml" ds:itemID="{1F2FE978-FCBC-4C90-A410-B547AA706062}">
   <ds:schemaRefs>
     <ds:schemaRef ds:uri="http://schemas.microsoft.com/office/2006/metadata/contentType"/>
@@ -15850,6 +15842,14 @@
 </ds:datastoreItem>
 </file>
 
+<file path=customXml/itemProps2.xml><?xml version="1.0" encoding="utf-8"?>
+<ds:datastoreItem xmlns:ds="http://schemas.openxmlformats.org/officeDocument/2006/customXml" ds:itemID="{6A7FA506-1E93-4CA4-B270-1F08FD18C366}">
+  <ds:schemaRefs>
+    <ds:schemaRef ds:uri="http://schemas.microsoft.com/sharepoint/v3/contenttype/forms"/>
+  </ds:schemaRefs>
+</ds:datastoreItem>
+</file>
+
 <file path=customXml/itemProps3.xml><?xml version="1.0" encoding="utf-8"?>
 <ds:datastoreItem xmlns:ds="http://schemas.openxmlformats.org/officeDocument/2006/customXml" ds:itemID="{38F4328E-77DF-41E8-952F-124AE19F1F7C}">
   <ds:schemaRefs>

</xml_diff>